<commit_message>
Fully Updated to final name?
</commit_message>
<xml_diff>
--- a/posts/1/slides.pptx
+++ b/posts/1/slides.pptx
@@ -4125,7 +4125,7 @@
         </p:nvSpPr>
         <p:spPr bwMode="auto">
           <a:xfrm flipH="0" flipV="0">
-            <a:off x="2330836" y="5304438"/>
+            <a:off x="2330836" y="5304437"/>
             <a:ext cx="3954888" cy="1554840"/>
           </a:xfrm>
           <a:prstGeom prst="rect">
@@ -4522,61 +4522,13 @@
       </p:cxnSp>
       <p:sp>
         <p:nvSpPr>
-          <p:cNvPr id="1454305622" name="TextBox 6"/>
-          <p:cNvSpPr txBox="1"/>
-          <p:nvPr/>
-        </p:nvSpPr>
-        <p:spPr bwMode="auto">
-          <a:xfrm rot="0" flipH="0" flipV="0">
-            <a:off x="581142" y="9443439"/>
-            <a:ext cx="3417258" cy="782425"/>
-          </a:xfrm>
-          <a:prstGeom prst="rect">
-            <a:avLst/>
-          </a:prstGeom>
-        </p:spPr>
-        <p:txBody>
-          <a:bodyPr lIns="0" tIns="0" rIns="0" bIns="0" rtlCol="0" anchor="t">
-            <a:spAutoFit/>
-          </a:bodyPr>
-          <a:lstStyle/>
-          <a:p>
-            <a:pPr algn="ctr">
-              <a:lnSpc>
-                <a:spcPts val="6157"/>
-              </a:lnSpc>
-              <a:defRPr/>
-            </a:pPr>
-            <a:r>
-              <a:rPr lang="en-US" sz="2600" b="0">
-                <a:solidFill>
-                  <a:schemeClr val="bg1"/>
-                </a:solidFill>
-                <a:latin typeface="Agave"/>
-                <a:ea typeface="Agave"/>
-                <a:cs typeface="Agave"/>
-              </a:rPr>
-              <a:t>Health and Happiness</a:t>
-            </a:r>
-            <a:endParaRPr sz="2600" b="0">
-              <a:solidFill>
-                <a:schemeClr val="bg1"/>
-              </a:solidFill>
-              <a:latin typeface="Tinos"/>
-              <a:cs typeface="Tinos"/>
-            </a:endParaRPr>
-          </a:p>
-        </p:txBody>
-      </p:sp>
-      <p:sp>
-        <p:nvSpPr>
           <p:cNvPr id="434183478" name="TextBox 6"/>
           <p:cNvSpPr txBox="1"/>
           <p:nvPr/>
         </p:nvSpPr>
         <p:spPr bwMode="auto">
           <a:xfrm rot="0" flipH="0" flipV="0">
-            <a:off x="-103062" y="710786"/>
+            <a:off x="-103061" y="710786"/>
             <a:ext cx="10562178" cy="782425"/>
           </a:xfrm>
           <a:prstGeom prst="rect">
@@ -4630,6 +4582,102 @@
               <a:latin typeface="Tinos"/>
               <a:cs typeface="Tinos"/>
             </a:endParaRPr>
+          </a:p>
+        </p:txBody>
+      </p:sp>
+      <p:sp>
+        <p:nvSpPr>
+          <p:cNvPr id="1487467227" name="TextBox 6"/>
+          <p:cNvSpPr txBox="1"/>
+          <p:nvPr/>
+        </p:nvSpPr>
+        <p:spPr bwMode="auto">
+          <a:xfrm rot="0" flipH="0" flipV="0">
+            <a:off x="501507" y="9279210"/>
+            <a:ext cx="4016785" cy="782298"/>
+          </a:xfrm>
+          <a:prstGeom prst="rect">
+            <a:avLst/>
+          </a:prstGeom>
+        </p:spPr>
+        <p:txBody>
+          <a:bodyPr lIns="0" tIns="0" rIns="0" bIns="0" rtlCol="0" anchor="t">
+            <a:spAutoFit/>
+          </a:bodyPr>
+          <a:lstStyle/>
+          <a:p>
+            <a:pPr algn="ctr">
+              <a:lnSpc>
+                <a:spcPts val="6156"/>
+              </a:lnSpc>
+              <a:defRPr/>
+            </a:pPr>
+            <a:r>
+              <a:rPr lang="en-US" sz="2600" b="0">
+                <a:solidFill>
+                  <a:schemeClr val="bg1"/>
+                </a:solidFill>
+                <a:latin typeface="Agave"/>
+                <a:ea typeface="Agave"/>
+                <a:cs typeface="Agave"/>
+              </a:rPr>
+              <a:t>Counsels on Lifestyle</a:t>
+            </a:r>
+            <a:endParaRPr sz="2600" b="0">
+              <a:solidFill>
+                <a:schemeClr val="bg1"/>
+              </a:solidFill>
+              <a:latin typeface="Tinos"/>
+              <a:cs typeface="Tinos"/>
+            </a:endParaRPr>
+          </a:p>
+        </p:txBody>
+      </p:sp>
+      <p:sp>
+        <p:nvSpPr>
+          <p:cNvPr id="1414792401" name=""/>
+          <p:cNvSpPr/>
+          <p:nvPr/>
+        </p:nvSpPr>
+        <p:spPr bwMode="auto">
+          <a:xfrm flipH="0" flipV="0">
+            <a:off x="25439" y="0"/>
+            <a:ext cx="10247583" cy="10286997"/>
+          </a:xfrm>
+          <a:prstGeom prst="rect">
+            <a:avLst/>
+          </a:prstGeom>
+          <a:noFill/>
+          <a:ln w="57150" cap="flat" cmpd="sng" algn="ctr">
+            <a:solidFill>
+              <a:schemeClr val="bg1"/>
+            </a:solidFill>
+            <a:prstDash val="solid"/>
+          </a:ln>
+        </p:spPr>
+        <p:style>
+          <a:lnRef idx="2">
+            <a:schemeClr val="accent1">
+              <a:shade val="50000"/>
+            </a:schemeClr>
+          </a:lnRef>
+          <a:fillRef idx="1">
+            <a:schemeClr val="accent1"/>
+          </a:fillRef>
+          <a:effectRef idx="0">
+            <a:schemeClr val="accent1"/>
+          </a:effectRef>
+          <a:fontRef idx="minor">
+            <a:schemeClr val="lt1"/>
+          </a:fontRef>
+        </p:style>
+        <p:txBody>
+          <a:bodyPr/>
+          <a:p>
+            <a:pPr>
+              <a:defRPr/>
+            </a:pPr>
+            <a:endParaRPr/>
           </a:p>
         </p:txBody>
       </p:sp>
@@ -5050,7 +5098,7 @@
         </p:nvSpPr>
         <p:spPr bwMode="auto">
           <a:xfrm rot="0" flipH="0" flipV="0">
-            <a:off x="-291595" y="163460"/>
+            <a:off x="-291594" y="163460"/>
             <a:ext cx="10969761" cy="1056872"/>
           </a:xfrm>
           <a:prstGeom prst="rect">
@@ -5167,14 +5215,14 @@
       </p:sp>
       <p:sp>
         <p:nvSpPr>
-          <p:cNvPr id="2052383326" name="TextBox 6"/>
+          <p:cNvPr id="1201266266" name="TextBox 6"/>
           <p:cNvSpPr txBox="1"/>
           <p:nvPr/>
         </p:nvSpPr>
         <p:spPr bwMode="auto">
           <a:xfrm rot="0" flipH="0" flipV="0">
-            <a:off x="581142" y="9443439"/>
-            <a:ext cx="3417258" cy="782425"/>
+            <a:off x="501507" y="9279210"/>
+            <a:ext cx="4016785" cy="782298"/>
           </a:xfrm>
           <a:prstGeom prst="rect">
             <a:avLst/>
@@ -5188,7 +5236,7 @@
           <a:p>
             <a:pPr algn="ctr">
               <a:lnSpc>
-                <a:spcPts val="6157"/>
+                <a:spcPts val="6156"/>
               </a:lnSpc>
               <a:defRPr/>
             </a:pPr>
@@ -5201,7 +5249,7 @@
                 <a:ea typeface="Agave"/>
                 <a:cs typeface="Agave"/>
               </a:rPr>
-              <a:t>Health and Happiness</a:t>
+              <a:t>Counsels on Lifestyle</a:t>
             </a:r>
             <a:endParaRPr sz="2600" b="0">
               <a:solidFill>
@@ -5210,6 +5258,54 @@
               <a:latin typeface="Tinos"/>
               <a:cs typeface="Tinos"/>
             </a:endParaRPr>
+          </a:p>
+        </p:txBody>
+      </p:sp>
+      <p:sp>
+        <p:nvSpPr>
+          <p:cNvPr id="486654365" name=""/>
+          <p:cNvSpPr/>
+          <p:nvPr/>
+        </p:nvSpPr>
+        <p:spPr bwMode="auto">
+          <a:xfrm flipH="0" flipV="0">
+            <a:off x="25439" y="0"/>
+            <a:ext cx="10247583" cy="10286997"/>
+          </a:xfrm>
+          <a:prstGeom prst="rect">
+            <a:avLst/>
+          </a:prstGeom>
+          <a:noFill/>
+          <a:ln w="57150" cap="flat" cmpd="sng" algn="ctr">
+            <a:solidFill>
+              <a:schemeClr val="bg1"/>
+            </a:solidFill>
+            <a:prstDash val="solid"/>
+          </a:ln>
+        </p:spPr>
+        <p:style>
+          <a:lnRef idx="2">
+            <a:schemeClr val="accent1">
+              <a:shade val="50000"/>
+            </a:schemeClr>
+          </a:lnRef>
+          <a:fillRef idx="1">
+            <a:schemeClr val="accent1"/>
+          </a:fillRef>
+          <a:effectRef idx="0">
+            <a:schemeClr val="accent1"/>
+          </a:effectRef>
+          <a:fontRef idx="minor">
+            <a:schemeClr val="lt1"/>
+          </a:fontRef>
+        </p:style>
+        <p:txBody>
+          <a:bodyPr/>
+          <a:p>
+            <a:pPr>
+              <a:defRPr/>
+            </a:pPr>
+            <a:endParaRPr/>
           </a:p>
         </p:txBody>
       </p:sp>
@@ -5353,8 +5449,8 @@
         </p:nvSpPr>
         <p:spPr bwMode="auto">
           <a:xfrm flipH="0" flipV="0">
-            <a:off x="1004103" y="1869804"/>
-            <a:ext cx="8253153" cy="7224119"/>
+            <a:off x="1004102" y="1869804"/>
+            <a:ext cx="8254592" cy="7224119"/>
           </a:xfrm>
           <a:prstGeom prst="rect">
             <a:avLst/>
@@ -5603,17 +5699,17 @@
             <a:r>
               <a:rPr lang="en-US" sz="2600" b="0" i="0" u="none" strike="noStrike" cap="none" spc="0">
                 <a:solidFill>
-                  <a:schemeClr val="bg1"/>
+                  <a:srgbClr val="EB6F92"/>
                 </a:solidFill>
                 <a:latin typeface="Agave"/>
                 <a:ea typeface="Agave"/>
                 <a:cs typeface="Agave"/>
               </a:rPr>
-              <a:t>[Counsels on Food and Diet, Ellen G. White]</a:t>
+              <a:t>-Counsels on Food and Diet, Ellen G. White</a:t>
             </a:r>
             <a:endParaRPr sz="2600" b="0" i="0" u="none" strike="noStrike" cap="none" spc="0">
               <a:solidFill>
-                <a:schemeClr val="bg1"/>
+                <a:srgbClr val="EB6F92"/>
               </a:solidFill>
               <a:latin typeface="Agave"/>
               <a:cs typeface="Agave"/>
@@ -5629,7 +5725,7 @@
         </p:nvSpPr>
         <p:spPr bwMode="auto">
           <a:xfrm rot="0" flipH="0" flipV="0">
-            <a:off x="-291595" y="163460"/>
+            <a:off x="-291594" y="163460"/>
             <a:ext cx="10969761" cy="1056872"/>
           </a:xfrm>
           <a:prstGeom prst="rect">
@@ -5675,54 +5771,6 @@
               <a:solidFill>
                 <a:schemeClr val="bg1"/>
               </a:solidFill>
-            </a:endParaRPr>
-          </a:p>
-        </p:txBody>
-      </p:sp>
-      <p:sp>
-        <p:nvSpPr>
-          <p:cNvPr id="1045696570" name="TextBox 6"/>
-          <p:cNvSpPr txBox="1"/>
-          <p:nvPr/>
-        </p:nvSpPr>
-        <p:spPr bwMode="auto">
-          <a:xfrm rot="0" flipH="0" flipV="0">
-            <a:off x="581142" y="9443439"/>
-            <a:ext cx="3417258" cy="782425"/>
-          </a:xfrm>
-          <a:prstGeom prst="rect">
-            <a:avLst/>
-          </a:prstGeom>
-        </p:spPr>
-        <p:txBody>
-          <a:bodyPr lIns="0" tIns="0" rIns="0" bIns="0" rtlCol="0" anchor="t">
-            <a:spAutoFit/>
-          </a:bodyPr>
-          <a:lstStyle/>
-          <a:p>
-            <a:pPr algn="ctr">
-              <a:lnSpc>
-                <a:spcPts val="6157"/>
-              </a:lnSpc>
-              <a:defRPr/>
-            </a:pPr>
-            <a:r>
-              <a:rPr lang="en-US" sz="2600" b="0">
-                <a:solidFill>
-                  <a:schemeClr val="bg1"/>
-                </a:solidFill>
-                <a:latin typeface="Agave"/>
-                <a:ea typeface="Agave"/>
-                <a:cs typeface="Agave"/>
-              </a:rPr>
-              <a:t>Health and Happiness</a:t>
-            </a:r>
-            <a:endParaRPr sz="2600" b="0">
-              <a:solidFill>
-                <a:schemeClr val="bg1"/>
-              </a:solidFill>
-              <a:latin typeface="Tinos"/>
-              <a:cs typeface="Tinos"/>
             </a:endParaRPr>
           </a:p>
         </p:txBody>
@@ -5789,6 +5837,102 @@
               <a:latin typeface="Tinos"/>
               <a:cs typeface="Tinos"/>
             </a:endParaRPr>
+          </a:p>
+        </p:txBody>
+      </p:sp>
+      <p:sp>
+        <p:nvSpPr>
+          <p:cNvPr id="1130362054" name="TextBox 6"/>
+          <p:cNvSpPr txBox="1"/>
+          <p:nvPr/>
+        </p:nvSpPr>
+        <p:spPr bwMode="auto">
+          <a:xfrm rot="0" flipH="0" flipV="0">
+            <a:off x="501507" y="9279210"/>
+            <a:ext cx="4016785" cy="782298"/>
+          </a:xfrm>
+          <a:prstGeom prst="rect">
+            <a:avLst/>
+          </a:prstGeom>
+        </p:spPr>
+        <p:txBody>
+          <a:bodyPr lIns="0" tIns="0" rIns="0" bIns="0" rtlCol="0" anchor="t">
+            <a:spAutoFit/>
+          </a:bodyPr>
+          <a:lstStyle/>
+          <a:p>
+            <a:pPr algn="ctr">
+              <a:lnSpc>
+                <a:spcPts val="6156"/>
+              </a:lnSpc>
+              <a:defRPr/>
+            </a:pPr>
+            <a:r>
+              <a:rPr lang="en-US" sz="2600" b="0">
+                <a:solidFill>
+                  <a:schemeClr val="bg1"/>
+                </a:solidFill>
+                <a:latin typeface="Agave"/>
+                <a:ea typeface="Agave"/>
+                <a:cs typeface="Agave"/>
+              </a:rPr>
+              <a:t>Counsels on Lifestyle</a:t>
+            </a:r>
+            <a:endParaRPr sz="2600" b="0">
+              <a:solidFill>
+                <a:schemeClr val="bg1"/>
+              </a:solidFill>
+              <a:latin typeface="Tinos"/>
+              <a:cs typeface="Tinos"/>
+            </a:endParaRPr>
+          </a:p>
+        </p:txBody>
+      </p:sp>
+      <p:sp>
+        <p:nvSpPr>
+          <p:cNvPr id="657739609" name=""/>
+          <p:cNvSpPr/>
+          <p:nvPr/>
+        </p:nvSpPr>
+        <p:spPr bwMode="auto">
+          <a:xfrm flipH="0" flipV="0">
+            <a:off x="25439" y="0"/>
+            <a:ext cx="10247583" cy="10286997"/>
+          </a:xfrm>
+          <a:prstGeom prst="rect">
+            <a:avLst/>
+          </a:prstGeom>
+          <a:noFill/>
+          <a:ln w="57150" cap="flat" cmpd="sng" algn="ctr">
+            <a:solidFill>
+              <a:schemeClr val="bg1"/>
+            </a:solidFill>
+            <a:prstDash val="solid"/>
+          </a:ln>
+        </p:spPr>
+        <p:style>
+          <a:lnRef idx="2">
+            <a:schemeClr val="accent1">
+              <a:shade val="50000"/>
+            </a:schemeClr>
+          </a:lnRef>
+          <a:fillRef idx="1">
+            <a:schemeClr val="accent1"/>
+          </a:fillRef>
+          <a:effectRef idx="0">
+            <a:schemeClr val="accent1"/>
+          </a:effectRef>
+          <a:fontRef idx="minor">
+            <a:schemeClr val="lt1"/>
+          </a:fontRef>
+        </p:style>
+        <p:txBody>
+          <a:bodyPr/>
+          <a:p>
+            <a:pPr>
+              <a:defRPr/>
+            </a:pPr>
+            <a:endParaRPr/>
           </a:p>
         </p:txBody>
       </p:sp>

</xml_diff>

<commit_message>
5 done and fixed some issues. still need to fix pages
</commit_message>
<xml_diff>
--- a/posts/1/slides.pptx
+++ b/posts/1/slides.pptx
@@ -3945,54 +3945,6 @@
           </a:fontRef>
         </p:style>
       </p:sp>
-      <p:sp>
-        <p:nvSpPr>
-          <p:cNvPr id="2049656921" name="TextBox 6"/>
-          <p:cNvSpPr txBox="1"/>
-          <p:nvPr/>
-        </p:nvSpPr>
-        <p:spPr bwMode="auto">
-          <a:xfrm rot="0" flipH="0" flipV="0">
-            <a:off x="-427813" y="163460"/>
-            <a:ext cx="11214921" cy="782552"/>
-          </a:xfrm>
-          <a:prstGeom prst="rect">
-            <a:avLst/>
-          </a:prstGeom>
-        </p:spPr>
-        <p:txBody>
-          <a:bodyPr lIns="0" tIns="0" rIns="0" bIns="0" rtlCol="0" anchor="t">
-            <a:spAutoFit/>
-          </a:bodyPr>
-          <a:lstStyle/>
-          <a:p>
-            <a:pPr algn="ctr">
-              <a:lnSpc>
-                <a:spcPts val="6159"/>
-              </a:lnSpc>
-              <a:defRPr/>
-            </a:pPr>
-            <a:r>
-              <a:rPr lang="en-US" sz="2600" b="0">
-                <a:solidFill>
-                  <a:schemeClr val="bg1"/>
-                </a:solidFill>
-                <a:latin typeface="Agave"/>
-                <a:ea typeface="Agave"/>
-                <a:cs typeface="Agave"/>
-              </a:rPr>
-              <a:t>Lower Glycemic Loads Means Lower Cardiovascular Disease Risk</a:t>
-            </a:r>
-            <a:endParaRPr sz="2600" b="0">
-              <a:solidFill>
-                <a:schemeClr val="bg1"/>
-              </a:solidFill>
-              <a:latin typeface="Tinos"/>
-              <a:cs typeface="Tinos"/>
-            </a:endParaRPr>
-          </a:p>
-        </p:txBody>
-      </p:sp>
       <p:pic>
         <p:nvPicPr>
           <p:cNvPr id="1181590362" name=""/>
@@ -4393,8 +4345,8 @@
         </p:nvSpPr>
         <p:spPr bwMode="auto">
           <a:xfrm rot="16199969" flipH="0" flipV="0">
-            <a:off x="-1779197" y="4811119"/>
-            <a:ext cx="5159287" cy="427079"/>
+            <a:off x="-1934249" y="4657506"/>
+            <a:ext cx="5472270" cy="427079"/>
           </a:xfrm>
           <a:prstGeom prst="rect">
             <a:avLst/>
@@ -4420,7 +4372,7 @@
                 <a:ea typeface="Agave"/>
                 <a:cs typeface="Agave"/>
               </a:rPr>
-              <a:t>Risk of Cardiovascular Disease</a:t>
+              <a:t>Risk of Cardiovascular Disease (CVD)</a:t>
             </a:r>
             <a:endParaRPr sz="2200">
               <a:solidFill>
@@ -4678,6 +4630,54 @@
               <a:defRPr/>
             </a:pPr>
             <a:endParaRPr/>
+          </a:p>
+        </p:txBody>
+      </p:sp>
+      <p:sp>
+        <p:nvSpPr>
+          <p:cNvPr id="423228420" name="TextBox 6"/>
+          <p:cNvSpPr txBox="1"/>
+          <p:nvPr/>
+        </p:nvSpPr>
+        <p:spPr bwMode="auto">
+          <a:xfrm rot="0" flipH="0" flipV="0">
+            <a:off x="-427812" y="163459"/>
+            <a:ext cx="11249838" cy="782552"/>
+          </a:xfrm>
+          <a:prstGeom prst="rect">
+            <a:avLst/>
+          </a:prstGeom>
+        </p:spPr>
+        <p:txBody>
+          <a:bodyPr lIns="0" tIns="0" rIns="0" bIns="0" rtlCol="0" anchor="t">
+            <a:spAutoFit/>
+          </a:bodyPr>
+          <a:lstStyle/>
+          <a:p>
+            <a:pPr algn="ctr">
+              <a:lnSpc>
+                <a:spcPts val="6158"/>
+              </a:lnSpc>
+              <a:defRPr/>
+            </a:pPr>
+            <a:r>
+              <a:rPr lang="en-US" sz="2400" b="0">
+                <a:solidFill>
+                  <a:schemeClr val="bg1"/>
+                </a:solidFill>
+                <a:latin typeface="Agave"/>
+                <a:ea typeface="Agave"/>
+                <a:cs typeface="Agave"/>
+              </a:rPr>
+              <a:t>Refined Sugars means Higher Cardiovascular Disease Risk (CVD)</a:t>
+            </a:r>
+            <a:endParaRPr sz="2600" b="0">
+              <a:solidFill>
+                <a:schemeClr val="bg1"/>
+              </a:solidFill>
+              <a:latin typeface="Tinos"/>
+              <a:cs typeface="Tinos"/>
+            </a:endParaRPr>
           </a:p>
         </p:txBody>
       </p:sp>
@@ -4822,7 +4822,7 @@
         <p:spPr bwMode="auto">
           <a:xfrm flipH="0" flipV="0">
             <a:off x="1028691" y="1785078"/>
-            <a:ext cx="8483192" cy="7772759"/>
+            <a:ext cx="8500471" cy="7772759"/>
           </a:xfrm>
           <a:prstGeom prst="rect">
             <a:avLst/>
@@ -4840,13 +4840,24 @@
             <a:r>
               <a:rPr lang="en-US" sz="2600" b="0" i="0" u="none" strike="noStrike" cap="none" spc="0">
                 <a:solidFill>
-                  <a:schemeClr val="bg1"/>
+                  <a:srgbClr val="00B0F0"/>
                 </a:solidFill>
                 <a:latin typeface="Agave"/>
                 <a:ea typeface="Agave"/>
                 <a:cs typeface="Agave"/>
               </a:rPr>
-              <a:t>Glycemic Load means how quickly a food increases your blood sugar.</a:t>
+              <a:t>Glycemic Load</a:t>
+            </a:r>
+            <a:r>
+              <a:rPr lang="en-US" sz="2600" b="0" i="0" u="none" strike="noStrike" cap="none" spc="0">
+                <a:solidFill>
+                  <a:schemeClr val="bg1"/>
+                </a:solidFill>
+                <a:latin typeface="Agave"/>
+                <a:ea typeface="Agave"/>
+                <a:cs typeface="Agave"/>
+              </a:rPr>
+              <a:t> means how quickly a food increases your blood sugar.</a:t>
             </a:r>
             <a:endParaRPr lang="en-US" sz="2600" b="0" i="0" u="none" strike="noStrike" cap="none" spc="0">
               <a:solidFill>
@@ -4866,63 +4877,7 @@
                 <a:schemeClr val="bg1"/>
               </a:solidFill>
               <a:latin typeface="Agave"/>
-              <a:cs typeface="Agave"/>
-            </a:endParaRPr>
-          </a:p>
-          <a:p>
-            <a:pPr>
-              <a:defRPr/>
-            </a:pPr>
-            <a:r>
-              <a:rPr lang="en-US" sz="2600" b="0" i="0" u="none" strike="noStrike" cap="none" spc="0">
-                <a:solidFill>
-                  <a:schemeClr val="bg1"/>
-                </a:solidFill>
-                <a:latin typeface="Agave"/>
-                <a:ea typeface="Agave"/>
-                <a:cs typeface="Agave"/>
-              </a:rPr>
-              <a:t>Foods like </a:t>
-            </a:r>
-            <a:r>
-              <a:rPr lang="en-US" sz="2600" b="0" i="0" u="none" strike="noStrike" cap="none" spc="0">
-                <a:solidFill>
-                  <a:srgbClr val="92D050"/>
-                </a:solidFill>
-                <a:latin typeface="Agave"/>
-                <a:ea typeface="Agave"/>
-                <a:cs typeface="Agave"/>
-              </a:rPr>
-              <a:t>added sugar, candy, white flour, white rice and breakfast meal and drinks with added sugar</a:t>
-            </a:r>
-            <a:r>
-              <a:rPr lang="en-US" sz="2600" b="0" i="0" u="none" strike="noStrike" cap="none" spc="0">
-                <a:solidFill>
-                  <a:schemeClr val="bg1"/>
-                </a:solidFill>
-                <a:latin typeface="Agave"/>
-                <a:ea typeface="Agave"/>
-                <a:cs typeface="Agave"/>
-              </a:rPr>
-              <a:t> have a higher glycemic load than fruits and whole foods.</a:t>
-            </a:r>
-            <a:endParaRPr lang="en-US" sz="2600" b="0" i="0" u="none" strike="noStrike" cap="none" spc="0">
-              <a:solidFill>
-                <a:schemeClr val="bg1"/>
-              </a:solidFill>
-              <a:latin typeface="Agave"/>
-              <a:cs typeface="Agave"/>
-            </a:endParaRPr>
-          </a:p>
-          <a:p>
-            <a:pPr>
-              <a:defRPr/>
-            </a:pPr>
-            <a:endParaRPr lang="en-US" sz="2600" b="0" i="0" u="none" strike="noStrike" cap="none" spc="0">
-              <a:solidFill>
-                <a:schemeClr val="bg1"/>
-              </a:solidFill>
-              <a:latin typeface="Agave"/>
+              <a:ea typeface="Agave"/>
               <a:cs typeface="Agave"/>
             </a:endParaRPr>
           </a:p>
@@ -4955,13 +4910,24 @@
             <a:r>
               <a:rPr lang="en-US" sz="2600" b="0" i="0" u="none" strike="noStrike" cap="none" spc="0">
                 <a:solidFill>
-                  <a:srgbClr val="92D050"/>
+                  <a:srgbClr val="FFC000"/>
                 </a:solidFill>
                 <a:latin typeface="Agave"/>
                 <a:ea typeface="Agave"/>
                 <a:cs typeface="Agave"/>
               </a:rPr>
-              <a:t>refined carbs like white flour increases the risk of </a:t>
+              <a:t>refined carbs</a:t>
+            </a:r>
+            <a:r>
+              <a:rPr lang="en-US" sz="2600" b="0" i="0" u="none" strike="noStrike" cap="none" spc="0">
+                <a:solidFill>
+                  <a:srgbClr val="92D050"/>
+                </a:solidFill>
+                <a:latin typeface="Agave"/>
+                <a:ea typeface="Agave"/>
+                <a:cs typeface="Agave"/>
+              </a:rPr>
+              <a:t> like white flour increases the risk of </a:t>
             </a:r>
             <a:r>
               <a:rPr lang="en-US" sz="2600" b="0" i="0" u="none" strike="noStrike" cap="none" spc="0">
@@ -4995,6 +4961,107 @@
             </a:endParaRPr>
           </a:p>
           <a:p>
+            <a:pPr>
+              <a:defRPr/>
+            </a:pPr>
+            <a:endParaRPr lang="en-US" sz="2600" b="0" i="0" u="none" strike="noStrike" cap="none" spc="0">
+              <a:solidFill>
+                <a:schemeClr val="bg1"/>
+              </a:solidFill>
+              <a:latin typeface="Agave"/>
+              <a:cs typeface="Agave"/>
+            </a:endParaRPr>
+          </a:p>
+          <a:p>
+            <a:pPr>
+              <a:defRPr/>
+            </a:pPr>
+            <a:r>
+              <a:rPr lang="en-US" sz="2600" b="0" i="0" u="none" strike="noStrike" cap="none" spc="0">
+                <a:solidFill>
+                  <a:schemeClr val="bg1"/>
+                </a:solidFill>
+                <a:latin typeface="Agave"/>
+                <a:ea typeface="Agave"/>
+                <a:cs typeface="Agave"/>
+              </a:rPr>
+              <a:t>Foods like </a:t>
+            </a:r>
+            <a:r>
+              <a:rPr lang="en-US" sz="2600" b="0" i="0" u="none" strike="noStrike" cap="none" spc="0">
+                <a:solidFill>
+                  <a:srgbClr val="FFC000"/>
+                </a:solidFill>
+                <a:latin typeface="Agave"/>
+                <a:ea typeface="Agave"/>
+                <a:cs typeface="Agave"/>
+              </a:rPr>
+              <a:t>added sugar, candy, white flour, white rice and breakfast meal and drinks with added sugar</a:t>
+            </a:r>
+            <a:r>
+              <a:rPr lang="en-US" sz="2600" b="0" i="0" u="none" strike="noStrike" cap="none" spc="0">
+                <a:solidFill>
+                  <a:schemeClr val="bg1"/>
+                </a:solidFill>
+                <a:latin typeface="Agave"/>
+                <a:ea typeface="Agave"/>
+                <a:cs typeface="Agave"/>
+              </a:rPr>
+              <a:t> have a </a:t>
+            </a:r>
+            <a:r>
+              <a:rPr lang="en-US" sz="2600" b="0" i="0" u="none" strike="noStrike" cap="none" spc="0">
+                <a:solidFill>
+                  <a:srgbClr val="00B0F0"/>
+                </a:solidFill>
+                <a:latin typeface="Agave"/>
+                <a:ea typeface="Agave"/>
+                <a:cs typeface="Agave"/>
+              </a:rPr>
+              <a:t>higher glycemic load</a:t>
+            </a:r>
+            <a:r>
+              <a:rPr lang="en-US" sz="2600" b="0" i="0" u="none" strike="noStrike" cap="none" spc="0">
+                <a:solidFill>
+                  <a:schemeClr val="bg1"/>
+                </a:solidFill>
+                <a:latin typeface="Agave"/>
+                <a:ea typeface="Agave"/>
+                <a:cs typeface="Agave"/>
+              </a:rPr>
+              <a:t> than </a:t>
+            </a:r>
+            <a:r>
+              <a:rPr lang="en-US" sz="2600" b="0" i="0" u="none" strike="noStrike" cap="none" spc="0">
+                <a:solidFill>
+                  <a:srgbClr val="92D050"/>
+                </a:solidFill>
+                <a:latin typeface="Agave"/>
+                <a:ea typeface="Agave"/>
+                <a:cs typeface="Agave"/>
+              </a:rPr>
+              <a:t>natural foods like fruits and whole foods</a:t>
+            </a:r>
+            <a:r>
+              <a:rPr lang="en-US" sz="2600" b="0" i="0" u="none" strike="noStrike" cap="none" spc="0">
+                <a:solidFill>
+                  <a:schemeClr val="bg1"/>
+                </a:solidFill>
+                <a:latin typeface="Agave"/>
+                <a:ea typeface="Agave"/>
+                <a:cs typeface="Agave"/>
+              </a:rPr>
+              <a:t>.</a:t>
+            </a:r>
+            <a:endParaRPr lang="en-US" sz="2600" b="0" i="0" u="none" strike="noStrike" cap="none" spc="0">
+              <a:solidFill>
+                <a:schemeClr val="bg1"/>
+              </a:solidFill>
+              <a:latin typeface="Agave"/>
+              <a:cs typeface="Agave"/>
+            </a:endParaRPr>
+          </a:p>
+          <a:p>
             <a:pPr algn="l">
               <a:defRPr/>
             </a:pPr>
@@ -5086,64 +5153,6 @@
               </a:solidFill>
               <a:latin typeface="Agave"/>
               <a:cs typeface="Agave"/>
-            </a:endParaRPr>
-          </a:p>
-        </p:txBody>
-      </p:sp>
-      <p:sp>
-        <p:nvSpPr>
-          <p:cNvPr id="207176182" name="TextBox 6"/>
-          <p:cNvSpPr txBox="1"/>
-          <p:nvPr/>
-        </p:nvSpPr>
-        <p:spPr bwMode="auto">
-          <a:xfrm rot="0" flipH="0" flipV="0">
-            <a:off x="-291594" y="163460"/>
-            <a:ext cx="10969761" cy="1056872"/>
-          </a:xfrm>
-          <a:prstGeom prst="rect">
-            <a:avLst/>
-          </a:prstGeom>
-        </p:spPr>
-        <p:txBody>
-          <a:bodyPr lIns="0" tIns="0" rIns="0" bIns="0" rtlCol="0" anchor="t">
-            <a:spAutoFit/>
-          </a:bodyPr>
-          <a:lstStyle/>
-          <a:p>
-            <a:pPr algn="ctr">
-              <a:lnSpc>
-                <a:spcPts val="6158"/>
-              </a:lnSpc>
-              <a:defRPr/>
-            </a:pPr>
-            <a:r>
-              <a:rPr lang="en-US" sz="2600" b="0" i="0" u="none" strike="noStrike" cap="none" spc="0">
-                <a:solidFill>
-                  <a:schemeClr val="bg1"/>
-                </a:solidFill>
-                <a:latin typeface="Agave"/>
-                <a:ea typeface="Agave"/>
-                <a:cs typeface="Agave"/>
-              </a:rPr>
-              <a:t>Lower Glycemic Loads Means Lower Cardiovascular Disease Risk</a:t>
-            </a:r>
-            <a:endParaRPr sz="2600" b="0">
-              <a:solidFill>
-                <a:schemeClr val="bg1"/>
-              </a:solidFill>
-              <a:latin typeface="Tinos"/>
-              <a:cs typeface="Tinos"/>
-            </a:endParaRPr>
-          </a:p>
-          <a:p>
-            <a:pPr>
-              <a:defRPr/>
-            </a:pPr>
-            <a:endParaRPr>
-              <a:solidFill>
-                <a:schemeClr val="bg1"/>
-              </a:solidFill>
             </a:endParaRPr>
           </a:p>
         </p:txBody>
@@ -5306,6 +5315,54 @@
               <a:defRPr/>
             </a:pPr>
             <a:endParaRPr/>
+          </a:p>
+        </p:txBody>
+      </p:sp>
+      <p:sp>
+        <p:nvSpPr>
+          <p:cNvPr id="1841081963" name="TextBox 6"/>
+          <p:cNvSpPr txBox="1"/>
+          <p:nvPr/>
+        </p:nvSpPr>
+        <p:spPr bwMode="auto">
+          <a:xfrm rot="0" flipH="0" flipV="0">
+            <a:off x="-427812" y="163459"/>
+            <a:ext cx="11250198" cy="782552"/>
+          </a:xfrm>
+          <a:prstGeom prst="rect">
+            <a:avLst/>
+          </a:prstGeom>
+        </p:spPr>
+        <p:txBody>
+          <a:bodyPr lIns="0" tIns="0" rIns="0" bIns="0" rtlCol="0" anchor="t">
+            <a:spAutoFit/>
+          </a:bodyPr>
+          <a:lstStyle/>
+          <a:p>
+            <a:pPr algn="ctr">
+              <a:lnSpc>
+                <a:spcPts val="6158"/>
+              </a:lnSpc>
+              <a:defRPr/>
+            </a:pPr>
+            <a:r>
+              <a:rPr lang="en-US" sz="2400" b="0">
+                <a:solidFill>
+                  <a:schemeClr val="bg1"/>
+                </a:solidFill>
+                <a:latin typeface="Agave"/>
+                <a:ea typeface="Agave"/>
+                <a:cs typeface="Agave"/>
+              </a:rPr>
+              <a:t>Refined Sugars means Higher Cardiovascular Disease Risk (CVD)</a:t>
+            </a:r>
+            <a:endParaRPr sz="2600" b="0">
+              <a:solidFill>
+                <a:schemeClr val="bg1"/>
+              </a:solidFill>
+              <a:latin typeface="Tinos"/>
+              <a:cs typeface="Tinos"/>
+            </a:endParaRPr>
           </a:p>
         </p:txBody>
       </p:sp>
@@ -5449,8 +5506,8 @@
         </p:nvSpPr>
         <p:spPr bwMode="auto">
           <a:xfrm flipH="0" flipV="0">
-            <a:off x="1004102" y="1869804"/>
-            <a:ext cx="8254592" cy="7224119"/>
+            <a:off x="1004100" y="1869804"/>
+            <a:ext cx="8259270" cy="7224119"/>
           </a:xfrm>
           <a:prstGeom prst="rect">
             <a:avLst/>
@@ -5468,7 +5525,7 @@
             <a:r>
               <a:rPr lang="en-US" sz="2600" b="0" i="0" u="none" strike="noStrike" cap="none" spc="0">
                 <a:solidFill>
-                  <a:srgbClr val="92D050"/>
+                  <a:srgbClr val="00B0F0"/>
                 </a:solidFill>
                 <a:latin typeface="Agave"/>
                 <a:ea typeface="Agave"/>
@@ -5485,7 +5542,29 @@
                 <a:ea typeface="Agave"/>
                 <a:cs typeface="Agave"/>
               </a:rPr>
-              <a:t> is ordinarily used in food. Cakes, sweet puddings, pastries, jellies, jams, </a:t>
+              <a:t> is ordinarily used i</a:t>
+            </a:r>
+            <a:r>
+              <a:rPr lang="en-US" sz="2600" b="0" i="0" u="none" strike="noStrike" cap="none" spc="0">
+                <a:solidFill>
+                  <a:srgbClr val="92D050"/>
+                </a:solidFill>
+                <a:latin typeface="Agave"/>
+                <a:ea typeface="Agave"/>
+                <a:cs typeface="Agave"/>
+              </a:rPr>
+              <a:t>n food. Cakes, sweet puddings, pastries, jellies, jams</a:t>
+            </a:r>
+            <a:r>
+              <a:rPr lang="en-US" sz="2600" b="0" i="0" u="none" strike="noStrike" cap="none" spc="0">
+                <a:solidFill>
+                  <a:schemeClr val="bg1"/>
+                </a:solidFill>
+                <a:latin typeface="Agave"/>
+                <a:ea typeface="Agave"/>
+                <a:cs typeface="Agave"/>
+              </a:rPr>
+              <a:t>, </a:t>
             </a:r>
             <a:endParaRPr sz="2600" b="0" i="0" u="none" strike="noStrike" cap="none" spc="0">
               <a:solidFill>
@@ -5515,7 +5594,7 @@
             <a:r>
               <a:rPr lang="en-US" sz="2600" b="0" i="0" u="none" strike="noStrike" cap="none" spc="0">
                 <a:solidFill>
-                  <a:schemeClr val="bg1"/>
+                  <a:srgbClr val="00B0F0"/>
                 </a:solidFill>
                 <a:latin typeface="Agave"/>
                 <a:ea typeface="Agave"/>
@@ -5526,13 +5605,13 @@
             <a:r>
               <a:rPr lang="en-US" sz="2600" b="0" i="0" u="none" strike="noStrike" cap="none" spc="0">
                 <a:solidFill>
-                  <a:schemeClr val="bg1"/>
+                  <a:srgbClr val="00B0F0"/>
                 </a:solidFill>
                 <a:latin typeface="Agave"/>
                 <a:ea typeface="Agave"/>
                 <a:cs typeface="Agave"/>
               </a:rPr>
-              <a:t>does not impart to the system the nourishment that is to be found in </a:t>
+              <a:t>does not impart to the system the nourishment</a:t>
             </a:r>
             <a:r>
               <a:rPr lang="en-US" sz="2600" b="0" i="0" u="none" strike="noStrike" cap="none" spc="0">
@@ -5543,12 +5622,45 @@
                 <a:ea typeface="Agave"/>
                 <a:cs typeface="Agave"/>
               </a:rPr>
-              <a:t>unbolted-wheat bread. </a:t>
+              <a:t> that is to be </a:t>
             </a:r>
             <a:r>
               <a:rPr lang="en-US" sz="2600" b="0" i="0" u="none" strike="noStrike" cap="none" spc="0">
                 <a:solidFill>
                   <a:srgbClr val="92D050"/>
+                </a:solidFill>
+                <a:latin typeface="Agave"/>
+                <a:ea typeface="Agave"/>
+                <a:cs typeface="Agave"/>
+              </a:rPr>
+              <a:t>found in </a:t>
+            </a:r>
+            <a:r>
+              <a:rPr lang="en-US" sz="2600" b="0" i="0" u="none" strike="noStrike" cap="none" spc="0">
+                <a:solidFill>
+                  <a:srgbClr val="92D050"/>
+                </a:solidFill>
+                <a:latin typeface="Agave"/>
+                <a:ea typeface="Agave"/>
+                <a:cs typeface="Agave"/>
+              </a:rPr>
+              <a:t>unbolted-wheat bread.</a:t>
+            </a:r>
+            <a:r>
+              <a:rPr lang="en-US" sz="2600" b="0" i="0" u="none" strike="noStrike" cap="none" spc="0">
+                <a:solidFill>
+                  <a:schemeClr val="bg1"/>
+                </a:solidFill>
+                <a:latin typeface="Agave"/>
+                <a:ea typeface="Agave"/>
+                <a:cs typeface="Agave"/>
+              </a:rPr>
+              <a:t> </a:t>
+            </a:r>
+            <a:r>
+              <a:rPr lang="en-US" sz="2600" b="0" i="0" u="none" strike="noStrike" cap="none" spc="0">
+                <a:solidFill>
+                  <a:srgbClr val="FFC000"/>
                 </a:solidFill>
                 <a:latin typeface="Agave"/>
                 <a:ea typeface="Agave"/>
@@ -5559,7 +5671,7 @@
             <a:r>
               <a:rPr lang="en-US" sz="2600" b="0" i="0" u="none" strike="noStrike" cap="none" spc="0">
                 <a:solidFill>
-                  <a:srgbClr val="92D050"/>
+                  <a:srgbClr val="FFC000"/>
                 </a:solidFill>
                 <a:latin typeface="Agave"/>
                 <a:ea typeface="Agave"/>
@@ -5613,18 +5725,18 @@
                 <a:ea typeface="Agave"/>
                 <a:cs typeface="Agave"/>
               </a:rPr>
-              <a:t>For use in bread-making, </a:t>
+              <a:t>Grains, fruits, nuts, and vegetables constitute the diet chosen for us by our Creator. These foods, prepared in as </a:t>
             </a:r>
             <a:r>
               <a:rPr lang="en-US" sz="2600" b="0" i="0" u="none" strike="noStrike" cap="none" spc="0">
                 <a:solidFill>
-                  <a:srgbClr val="92D050"/>
+                  <a:srgbClr val="00B0F0"/>
                 </a:solidFill>
                 <a:latin typeface="Agave"/>
                 <a:ea typeface="Agave"/>
                 <a:cs typeface="Agave"/>
               </a:rPr>
-              <a:t>the superfine white flour is not the best</a:t>
+              <a:t>simple and natural a manner as possible</a:t>
             </a:r>
             <a:r>
               <a:rPr lang="en-US" sz="2600" b="0" i="0" u="none" strike="noStrike" cap="none" spc="0">
@@ -5635,7 +5747,7 @@
                 <a:ea typeface="Agave"/>
                 <a:cs typeface="Agave"/>
               </a:rPr>
-              <a:t>. Its use is neither healthful nor economical. </a:t>
+              <a:t>, are the </a:t>
             </a:r>
             <a:r>
               <a:rPr lang="en-US" sz="2600" b="0" i="0" u="none" strike="noStrike" cap="none" spc="0">
@@ -5646,7 +5758,7 @@
                 <a:ea typeface="Agave"/>
                 <a:cs typeface="Agave"/>
               </a:rPr>
-              <a:t>Fine-flour bread is lacking in nutritive elements to be found in bread made from the whole wheat</a:t>
+              <a:t>most healthful and nourishing</a:t>
             </a:r>
             <a:r>
               <a:rPr lang="en-US" sz="2600" b="0" i="0" u="none" strike="noStrike" cap="none" spc="0">
@@ -5657,7 +5769,29 @@
                 <a:ea typeface="Agave"/>
                 <a:cs typeface="Agave"/>
               </a:rPr>
-              <a:t>. It is a frequent cause of constipation and other unhealthful conditions.</a:t>
+              <a:t>. They impart a strength, a power of endurance, and a vigor of intellect that </a:t>
+            </a:r>
+            <a:r>
+              <a:rPr lang="en-US" sz="2600" b="0" i="0" u="none" strike="noStrike" cap="none" spc="0">
+                <a:solidFill>
+                  <a:srgbClr val="FFC000"/>
+                </a:solidFill>
+                <a:latin typeface="Agave"/>
+                <a:ea typeface="Agave"/>
+                <a:cs typeface="Agave"/>
+              </a:rPr>
+              <a:t>are not afforded by a more complex and stimulating diet</a:t>
+            </a:r>
+            <a:r>
+              <a:rPr lang="en-US" sz="2600" b="0" i="0" u="none" strike="noStrike" cap="none" spc="0">
+                <a:solidFill>
+                  <a:schemeClr val="bg1"/>
+                </a:solidFill>
+                <a:latin typeface="Agave"/>
+                <a:ea typeface="Agave"/>
+                <a:cs typeface="Agave"/>
+              </a:rPr>
+              <a:t>.</a:t>
             </a:r>
             <a:endParaRPr lang="en-US" sz="2600" b="0" i="0" u="none" strike="noStrike" cap="none" spc="0">
               <a:solidFill>
@@ -5677,6 +5811,7 @@
                 <a:schemeClr val="bg1"/>
               </a:solidFill>
               <a:latin typeface="Agave"/>
+              <a:ea typeface="Agave"/>
               <a:cs typeface="Agave"/>
             </a:endParaRPr>
           </a:p>
@@ -5713,64 +5848,6 @@
               </a:solidFill>
               <a:latin typeface="Agave"/>
               <a:cs typeface="Agave"/>
-            </a:endParaRPr>
-          </a:p>
-        </p:txBody>
-      </p:sp>
-      <p:sp>
-        <p:nvSpPr>
-          <p:cNvPr id="650904954" name="TextBox 6"/>
-          <p:cNvSpPr txBox="1"/>
-          <p:nvPr/>
-        </p:nvSpPr>
-        <p:spPr bwMode="auto">
-          <a:xfrm rot="0" flipH="0" flipV="0">
-            <a:off x="-291594" y="163460"/>
-            <a:ext cx="10969761" cy="1056872"/>
-          </a:xfrm>
-          <a:prstGeom prst="rect">
-            <a:avLst/>
-          </a:prstGeom>
-        </p:spPr>
-        <p:txBody>
-          <a:bodyPr lIns="0" tIns="0" rIns="0" bIns="0" rtlCol="0" anchor="t">
-            <a:spAutoFit/>
-          </a:bodyPr>
-          <a:lstStyle/>
-          <a:p>
-            <a:pPr algn="ctr">
-              <a:lnSpc>
-                <a:spcPts val="6158"/>
-              </a:lnSpc>
-              <a:defRPr/>
-            </a:pPr>
-            <a:r>
-              <a:rPr lang="en-US" sz="2600" b="0" i="0" u="none" strike="noStrike" cap="none" spc="0">
-                <a:solidFill>
-                  <a:schemeClr val="bg1"/>
-                </a:solidFill>
-                <a:latin typeface="Agave"/>
-                <a:ea typeface="Agave"/>
-                <a:cs typeface="Agave"/>
-              </a:rPr>
-              <a:t>Lower Glycemic Loads Means Lower Cardiovascular Disease Risk</a:t>
-            </a:r>
-            <a:endParaRPr sz="2600" b="0">
-              <a:solidFill>
-                <a:schemeClr val="bg1"/>
-              </a:solidFill>
-              <a:latin typeface="Tinos"/>
-              <a:cs typeface="Tinos"/>
-            </a:endParaRPr>
-          </a:p>
-          <a:p>
-            <a:pPr>
-              <a:defRPr/>
-            </a:pPr>
-            <a:endParaRPr>
-              <a:solidFill>
-                <a:schemeClr val="bg1"/>
-              </a:solidFill>
             </a:endParaRPr>
           </a:p>
         </p:txBody>
@@ -5933,6 +6010,54 @@
               <a:defRPr/>
             </a:pPr>
             <a:endParaRPr/>
+          </a:p>
+        </p:txBody>
+      </p:sp>
+      <p:sp>
+        <p:nvSpPr>
+          <p:cNvPr id="910733129" name="TextBox 6"/>
+          <p:cNvSpPr txBox="1"/>
+          <p:nvPr/>
+        </p:nvSpPr>
+        <p:spPr bwMode="auto">
+          <a:xfrm rot="0" flipH="0" flipV="0">
+            <a:off x="-427812" y="163459"/>
+            <a:ext cx="11250198" cy="782552"/>
+          </a:xfrm>
+          <a:prstGeom prst="rect">
+            <a:avLst/>
+          </a:prstGeom>
+        </p:spPr>
+        <p:txBody>
+          <a:bodyPr lIns="0" tIns="0" rIns="0" bIns="0" rtlCol="0" anchor="t">
+            <a:spAutoFit/>
+          </a:bodyPr>
+          <a:lstStyle/>
+          <a:p>
+            <a:pPr algn="ctr">
+              <a:lnSpc>
+                <a:spcPts val="6158"/>
+              </a:lnSpc>
+              <a:defRPr/>
+            </a:pPr>
+            <a:r>
+              <a:rPr lang="en-US" sz="2400" b="0">
+                <a:solidFill>
+                  <a:schemeClr val="bg1"/>
+                </a:solidFill>
+                <a:latin typeface="Agave"/>
+                <a:ea typeface="Agave"/>
+                <a:cs typeface="Agave"/>
+              </a:rPr>
+              <a:t>Refined Sugars means Higher Cardiovascular Disease Risk (CVD)</a:t>
+            </a:r>
+            <a:endParaRPr sz="2600" b="0">
+              <a:solidFill>
+                <a:schemeClr val="bg1"/>
+              </a:solidFill>
+              <a:latin typeface="Tinos"/>
+              <a:cs typeface="Tinos"/>
+            </a:endParaRPr>
           </a:p>
         </p:txBody>
       </p:sp>

</xml_diff>